<commit_message>
Filled an empty reference.
</commit_message>
<xml_diff>
--- a/Week 11/Week 11 - Data Definitions.pptx
+++ b/Week 11/Week 11 - Data Definitions.pptx
@@ -243,7 +243,7 @@
           <a:p>
             <a:fld id="{E5CB2E47-6F41-409B-AD22-834AE1EFF186}" type="datetimeFigureOut">
               <a:rPr lang="en-US" smtClean="0"/>
-              <a:t>06-Aug-19</a:t>
+              <a:t>8/6/2019</a:t>
             </a:fld>
             <a:endParaRPr lang="en-US" dirty="0"/>
           </a:p>
@@ -408,7 +408,7 @@
           <a:p>
             <a:fld id="{FAD6744A-403D-42A1-BFE7-61DA46EE7C6C}" type="datetimeFigureOut">
               <a:rPr lang="en-US" smtClean="0"/>
-              <a:t>06-Aug-19</a:t>
+              <a:t>8/6/2019</a:t>
             </a:fld>
             <a:endParaRPr lang="en-US" dirty="0"/>
           </a:p>
@@ -1103,7 +1103,7 @@
           <a:p>
             <a:fld id="{349BF3EA-1A78-4F07-BDC0-C8A1BD461199}" type="datetimeFigureOut">
               <a:rPr lang="en-US" smtClean="0"/>
-              <a:t>06-Aug-19</a:t>
+              <a:t>8/6/2019</a:t>
             </a:fld>
             <a:endParaRPr lang="en-US" dirty="0"/>
           </a:p>
@@ -1287,7 +1287,7 @@
           <a:p>
             <a:fld id="{349BF3EA-1A78-4F07-BDC0-C8A1BD461199}" type="datetimeFigureOut">
               <a:rPr lang="en-US" smtClean="0"/>
-              <a:t>06-Aug-19</a:t>
+              <a:t>8/6/2019</a:t>
             </a:fld>
             <a:endParaRPr lang="en-US" dirty="0"/>
           </a:p>
@@ -1481,7 +1481,7 @@
           <a:p>
             <a:fld id="{349BF3EA-1A78-4F07-BDC0-C8A1BD461199}" type="datetimeFigureOut">
               <a:rPr lang="en-US" smtClean="0"/>
-              <a:t>06-Aug-19</a:t>
+              <a:t>8/6/2019</a:t>
             </a:fld>
             <a:endParaRPr lang="en-US" dirty="0"/>
           </a:p>
@@ -1670,7 +1670,7 @@
           <a:p>
             <a:fld id="{349BF3EA-1A78-4F07-BDC0-C8A1BD461199}" type="datetimeFigureOut">
               <a:rPr lang="en-US" smtClean="0"/>
-              <a:t>06-Aug-19</a:t>
+              <a:t>8/6/2019</a:t>
             </a:fld>
             <a:endParaRPr lang="en-US" dirty="0"/>
           </a:p>
@@ -2136,7 +2136,7 @@
           <a:p>
             <a:fld id="{349BF3EA-1A78-4F07-BDC0-C8A1BD461199}" type="datetimeFigureOut">
               <a:rPr lang="en-US" smtClean="0"/>
-              <a:t>06-Aug-19</a:t>
+              <a:t>8/6/2019</a:t>
             </a:fld>
             <a:endParaRPr lang="en-US" dirty="0"/>
           </a:p>
@@ -2382,7 +2382,7 @@
           <a:p>
             <a:fld id="{349BF3EA-1A78-4F07-BDC0-C8A1BD461199}" type="datetimeFigureOut">
               <a:rPr lang="en-US" smtClean="0"/>
-              <a:t>06-Aug-19</a:t>
+              <a:t>8/6/2019</a:t>
             </a:fld>
             <a:endParaRPr lang="en-US" dirty="0"/>
           </a:p>
@@ -2767,7 +2767,7 @@
           <a:p>
             <a:fld id="{349BF3EA-1A78-4F07-BDC0-C8A1BD461199}" type="datetimeFigureOut">
               <a:rPr lang="en-US" smtClean="0"/>
-              <a:t>06-Aug-19</a:t>
+              <a:t>8/6/2019</a:t>
             </a:fld>
             <a:endParaRPr lang="en-US" dirty="0"/>
           </a:p>
@@ -2899,7 +2899,7 @@
           <a:p>
             <a:fld id="{349BF3EA-1A78-4F07-BDC0-C8A1BD461199}" type="datetimeFigureOut">
               <a:rPr lang="en-US" smtClean="0"/>
-              <a:t>06-Aug-19</a:t>
+              <a:t>8/6/2019</a:t>
             </a:fld>
             <a:endParaRPr lang="en-US" dirty="0"/>
           </a:p>
@@ -3009,7 +3009,7 @@
           <a:p>
             <a:fld id="{349BF3EA-1A78-4F07-BDC0-C8A1BD461199}" type="datetimeFigureOut">
               <a:rPr lang="en-US" smtClean="0"/>
-              <a:t>06-Aug-19</a:t>
+              <a:t>8/6/2019</a:t>
             </a:fld>
             <a:endParaRPr lang="en-US" dirty="0"/>
           </a:p>
@@ -3353,7 +3353,7 @@
           <a:p>
             <a:fld id="{349BF3EA-1A78-4F07-BDC0-C8A1BD461199}" type="datetimeFigureOut">
               <a:rPr lang="en-US" smtClean="0"/>
-              <a:t>06-Aug-19</a:t>
+              <a:t>8/6/2019</a:t>
             </a:fld>
             <a:endParaRPr lang="en-US" dirty="0"/>
           </a:p>
@@ -3742,7 +3742,7 @@
           <a:p>
             <a:fld id="{349BF3EA-1A78-4F07-BDC0-C8A1BD461199}" type="datetimeFigureOut">
               <a:rPr lang="en-US" smtClean="0"/>
-              <a:t>06-Aug-19</a:t>
+              <a:t>8/6/2019</a:t>
             </a:fld>
             <a:endParaRPr lang="en-US" dirty="0"/>
           </a:p>
@@ -4104,7 +4104,7 @@
           <a:p>
             <a:fld id="{349BF3EA-1A78-4F07-BDC0-C8A1BD461199}" type="datetimeFigureOut">
               <a:rPr lang="en-US" smtClean="0"/>
-              <a:t>06-Aug-19</a:t>
+              <a:t>8/6/2019</a:t>
             </a:fld>
             <a:endParaRPr lang="en-US" dirty="0"/>
           </a:p>
@@ -11320,14 +11320,14 @@
           <p:nvPr>
             <p:extLst>
               <p:ext uri="{D42A27DB-BD31-4B8C-83A1-F6EECF244321}">
-                <p14:modId xmlns:p14="http://schemas.microsoft.com/office/powerpoint/2010/main" val="469120891"/>
+                <p14:modId xmlns:p14="http://schemas.microsoft.com/office/powerpoint/2010/main" val="1361834040"/>
               </p:ext>
             </p:extLst>
           </p:nvPr>
         </p:nvGraphicFramePr>
         <p:xfrm>
           <a:off x="1123406" y="2024744"/>
-          <a:ext cx="9757955" cy="3369054"/>
+          <a:ext cx="9983471" cy="3369054"/>
         </p:xfrm>
         <a:graphic>
           <a:graphicData uri="http://schemas.openxmlformats.org/drawingml/2006/table">
@@ -11336,28 +11336,28 @@
                 <a:tableStyleId>{21E4AEA4-8DFA-4A89-87EB-49C32662AFE0}</a:tableStyleId>
               </a:tblPr>
               <a:tblGrid>
-                <a:gridCol w="1836458">
+                <a:gridCol w="1878900">
                   <a:extLst>
                     <a:ext uri="{9D8B030D-6E8A-4147-A177-3AD203B41FA5}">
                       <a16:colId xmlns:a16="http://schemas.microsoft.com/office/drawing/2014/main" val="3526549770"/>
                     </a:ext>
                   </a:extLst>
                 </a:gridCol>
-                <a:gridCol w="3042115">
+                <a:gridCol w="3112421">
                   <a:extLst>
                     <a:ext uri="{9D8B030D-6E8A-4147-A177-3AD203B41FA5}">
                       <a16:colId xmlns:a16="http://schemas.microsoft.com/office/drawing/2014/main" val="4206730915"/>
                     </a:ext>
                   </a:extLst>
                 </a:gridCol>
-                <a:gridCol w="2439691">
+                <a:gridCol w="2496075">
                   <a:extLst>
                     <a:ext uri="{9D8B030D-6E8A-4147-A177-3AD203B41FA5}">
                       <a16:colId xmlns:a16="http://schemas.microsoft.com/office/drawing/2014/main" val="3761522970"/>
                     </a:ext>
                   </a:extLst>
                 </a:gridCol>
-                <a:gridCol w="2439691">
+                <a:gridCol w="2496075">
                   <a:extLst>
                     <a:ext uri="{9D8B030D-6E8A-4147-A177-3AD203B41FA5}">
                       <a16:colId xmlns:a16="http://schemas.microsoft.com/office/drawing/2014/main" val="1825429268"/>
@@ -11518,115 +11518,115 @@
                         </a:spcAft>
                       </a:pPr>
                       <a:r>
-                        <a:rPr lang="en-GB" sz="1800" b="0">
+                        <a:rPr lang="en-GB" sz="1800" b="0" dirty="0" err="1">
                           <a:solidFill>
                             <a:schemeClr val="tx1"/>
                           </a:solidFill>
                           <a:effectLst/>
-                          <a:latin typeface="Times New Roman" panose="02020603050405020304" pitchFamily="18" charset="0"/>
-                          <a:ea typeface="Times New Roman" panose="02020603050405020304" pitchFamily="18" charset="0"/>
-                          <a:cs typeface="Times New Roman" panose="02020603050405020304" pitchFamily="18" charset="0"/>
+                          <a:latin typeface="Times New Roman"/>
+                          <a:ea typeface="Times New Roman" panose="02020603050405020304" pitchFamily="18" charset="0"/>
+                          <a:cs typeface="Times New Roman"/>
                         </a:rPr>
                         <a:t>payment_no</a:t>
                       </a:r>
-                      <a:endParaRPr lang="en-US" sz="1800" b="0">
+                      <a:endParaRPr lang="en-US" sz="1800" b="0" dirty="0" err="1">
                         <a:solidFill>
                           <a:schemeClr val="tx1"/>
                         </a:solidFill>
                         <a:effectLst/>
-                        <a:latin typeface="Calibri" panose="020F0502020204030204" pitchFamily="34" charset="0"/>
-                        <a:ea typeface="Calibri" panose="020F0502020204030204" pitchFamily="34" charset="0"/>
-                        <a:cs typeface="Times New Roman" panose="02020603050405020304" pitchFamily="18" charset="0"/>
-                      </a:endParaRPr>
-                    </a:p>
-                  </a:txBody>
-                  <a:tcPr marL="68580" marR="68580" marT="0" marB="0">
-                    <a:solidFill>
-                      <a:srgbClr val="EFE8E7"/>
-                    </a:solidFill>
-                  </a:tcPr>
-                </a:tc>
-                <a:tc>
-                  <a:txBody>
-                    <a:bodyPr/>
-                    <a:lstStyle/>
-                    <a:p>
-                      <a:pPr marL="0" marR="0">
-                        <a:lnSpc>
-                          <a:spcPct val="107000"/>
-                        </a:lnSpc>
-                        <a:spcBef>
-                          <a:spcPts val="0"/>
-                        </a:spcBef>
-                        <a:spcAft>
-                          <a:spcPts val="0"/>
-                        </a:spcAft>
-                      </a:pPr>
-                      <a:r>
-                        <a:rPr lang="en-GB" sz="1800" b="0">
+                        <a:latin typeface="Times New Roman"/>
+                        <a:ea typeface="Calibri" panose="020F0502020204030204" pitchFamily="34" charset="0"/>
+                        <a:cs typeface="Times New Roman"/>
+                      </a:endParaRPr>
+                    </a:p>
+                  </a:txBody>
+                  <a:tcPr marL="68580" marR="68580" marT="0" marB="0">
+                    <a:solidFill>
+                      <a:srgbClr val="EFE8E7"/>
+                    </a:solidFill>
+                  </a:tcPr>
+                </a:tc>
+                <a:tc>
+                  <a:txBody>
+                    <a:bodyPr/>
+                    <a:lstStyle/>
+                    <a:p>
+                      <a:pPr marL="0" marR="0">
+                        <a:lnSpc>
+                          <a:spcPct val="107000"/>
+                        </a:lnSpc>
+                        <a:spcBef>
+                          <a:spcPts val="0"/>
+                        </a:spcBef>
+                        <a:spcAft>
+                          <a:spcPts val="0"/>
+                        </a:spcAft>
+                      </a:pPr>
+                      <a:r>
+                        <a:rPr lang="en-GB" sz="1800" b="0" dirty="0">
                           <a:solidFill>
                             <a:schemeClr val="tx1"/>
                           </a:solidFill>
                           <a:effectLst/>
-                          <a:latin typeface="Times New Roman" panose="02020603050405020304" pitchFamily="18" charset="0"/>
-                          <a:ea typeface="Times New Roman" panose="02020603050405020304" pitchFamily="18" charset="0"/>
-                          <a:cs typeface="Times New Roman" panose="02020603050405020304" pitchFamily="18" charset="0"/>
+                          <a:latin typeface="Times New Roman"/>
+                          <a:ea typeface="Times New Roman" panose="02020603050405020304" pitchFamily="18" charset="0"/>
+                          <a:cs typeface="Times New Roman"/>
                         </a:rPr>
                         <a:t>varchar(5)</a:t>
                       </a:r>
-                      <a:endParaRPr lang="en-US" sz="1800" b="0">
+                      <a:endParaRPr lang="en-US" sz="1800" b="0" dirty="0">
                         <a:solidFill>
                           <a:schemeClr val="tx1"/>
                         </a:solidFill>
                         <a:effectLst/>
-                        <a:latin typeface="Calibri" panose="020F0502020204030204" pitchFamily="34" charset="0"/>
-                        <a:ea typeface="Calibri" panose="020F0502020204030204" pitchFamily="34" charset="0"/>
-                        <a:cs typeface="Times New Roman" panose="02020603050405020304" pitchFamily="18" charset="0"/>
-                      </a:endParaRPr>
-                    </a:p>
-                  </a:txBody>
-                  <a:tcPr marL="68580" marR="68580" marT="0" marB="0">
-                    <a:solidFill>
-                      <a:srgbClr val="EFE8E7"/>
-                    </a:solidFill>
-                  </a:tcPr>
-                </a:tc>
-                <a:tc>
-                  <a:txBody>
-                    <a:bodyPr/>
-                    <a:lstStyle/>
-                    <a:p>
-                      <a:pPr marL="0" marR="0">
-                        <a:lnSpc>
-                          <a:spcPct val="107000"/>
-                        </a:lnSpc>
-                        <a:spcBef>
-                          <a:spcPts val="0"/>
-                        </a:spcBef>
-                        <a:spcAft>
-                          <a:spcPts val="0"/>
-                        </a:spcAft>
-                      </a:pPr>
-                      <a:r>
-                        <a:rPr lang="en-GB" sz="1800" b="0">
+                        <a:latin typeface="Times New Roman"/>
+                        <a:ea typeface="Calibri" panose="020F0502020204030204" pitchFamily="34" charset="0"/>
+                        <a:cs typeface="Times New Roman"/>
+                      </a:endParaRPr>
+                    </a:p>
+                  </a:txBody>
+                  <a:tcPr marL="68580" marR="68580" marT="0" marB="0">
+                    <a:solidFill>
+                      <a:srgbClr val="EFE8E7"/>
+                    </a:solidFill>
+                  </a:tcPr>
+                </a:tc>
+                <a:tc>
+                  <a:txBody>
+                    <a:bodyPr/>
+                    <a:lstStyle/>
+                    <a:p>
+                      <a:pPr marL="0" marR="0">
+                        <a:lnSpc>
+                          <a:spcPct val="107000"/>
+                        </a:lnSpc>
+                        <a:spcBef>
+                          <a:spcPts val="0"/>
+                        </a:spcBef>
+                        <a:spcAft>
+                          <a:spcPts val="0"/>
+                        </a:spcAft>
+                      </a:pPr>
+                      <a:r>
+                        <a:rPr lang="en-GB" sz="1800" b="0" dirty="0">
                           <a:solidFill>
                             <a:schemeClr val="tx1"/>
                           </a:solidFill>
                           <a:effectLst/>
-                          <a:latin typeface="Times New Roman" panose="02020603050405020304" pitchFamily="18" charset="0"/>
-                          <a:ea typeface="Times New Roman" panose="02020603050405020304" pitchFamily="18" charset="0"/>
-                          <a:cs typeface="Times New Roman" panose="02020603050405020304" pitchFamily="18" charset="0"/>
+                          <a:latin typeface="Times New Roman"/>
+                          <a:ea typeface="Times New Roman" panose="02020603050405020304" pitchFamily="18" charset="0"/>
+                          <a:cs typeface="Times New Roman"/>
                         </a:rPr>
                         <a:t>Primary Key</a:t>
                       </a:r>
-                      <a:endParaRPr lang="en-US" sz="1800" b="0">
+                      <a:endParaRPr lang="en-US" sz="1800" b="0" dirty="0">
                         <a:solidFill>
                           <a:schemeClr val="tx1"/>
                         </a:solidFill>
                         <a:effectLst/>
-                        <a:latin typeface="Calibri" panose="020F0502020204030204" pitchFamily="34" charset="0"/>
-                        <a:ea typeface="Calibri" panose="020F0502020204030204" pitchFamily="34" charset="0"/>
-                        <a:cs typeface="Times New Roman" panose="02020603050405020304" pitchFamily="18" charset="0"/>
+                        <a:latin typeface="Times New Roman"/>
+                        <a:ea typeface="Calibri" panose="020F0502020204030204" pitchFamily="34" charset="0"/>
+                        <a:cs typeface="Times New Roman"/>
                       </a:endParaRPr>
                     </a:p>
                   </a:txBody>
@@ -11649,25 +11649,25 @@
                         </a:spcAft>
                       </a:pPr>
                       <a:r>
-                        <a:rPr lang="en-GB" sz="1800" b="0">
+                        <a:rPr lang="en-GB" sz="1800" b="0" dirty="0">
                           <a:solidFill>
                             <a:schemeClr val="tx1"/>
                           </a:solidFill>
                           <a:effectLst/>
-                          <a:latin typeface="Times New Roman" panose="02020603050405020304" pitchFamily="18" charset="0"/>
-                          <a:ea typeface="Times New Roman" panose="02020603050405020304" pitchFamily="18" charset="0"/>
-                          <a:cs typeface="Times New Roman" panose="02020603050405020304" pitchFamily="18" charset="0"/>
+                          <a:latin typeface="Times New Roman"/>
+                          <a:ea typeface="Times New Roman" panose="02020603050405020304" pitchFamily="18" charset="0"/>
+                          <a:cs typeface="Times New Roman"/>
                         </a:rPr>
                         <a:t>-</a:t>
                       </a:r>
-                      <a:endParaRPr lang="en-US" sz="1800" b="0">
+                      <a:endParaRPr lang="en-US" sz="1800" b="0" dirty="0">
                         <a:solidFill>
                           <a:schemeClr val="tx1"/>
                         </a:solidFill>
                         <a:effectLst/>
-                        <a:latin typeface="Calibri" panose="020F0502020204030204" pitchFamily="34" charset="0"/>
-                        <a:ea typeface="Calibri" panose="020F0502020204030204" pitchFamily="34" charset="0"/>
-                        <a:cs typeface="Times New Roman" panose="02020603050405020304" pitchFamily="18" charset="0"/>
+                        <a:latin typeface="Times New Roman"/>
+                        <a:ea typeface="Calibri" panose="020F0502020204030204" pitchFamily="34" charset="0"/>
+                        <a:cs typeface="Times New Roman"/>
                       </a:endParaRPr>
                     </a:p>
                   </a:txBody>
@@ -11697,70 +11697,70 @@
                         </a:spcAft>
                       </a:pPr>
                       <a:r>
-                        <a:rPr lang="en-GB" sz="1800" b="0">
+                        <a:rPr lang="en-GB" sz="1800" b="0" dirty="0">
                           <a:solidFill>
                             <a:schemeClr val="tx1"/>
                           </a:solidFill>
                           <a:effectLst/>
-                          <a:latin typeface="Times New Roman" panose="02020603050405020304" pitchFamily="18" charset="0"/>
-                          <a:ea typeface="Times New Roman" panose="02020603050405020304" pitchFamily="18" charset="0"/>
-                          <a:cs typeface="Times New Roman" panose="02020603050405020304" pitchFamily="18" charset="0"/>
+                          <a:latin typeface="Times New Roman"/>
+                          <a:ea typeface="Times New Roman" panose="02020603050405020304" pitchFamily="18" charset="0"/>
+                          <a:cs typeface="Times New Roman"/>
                         </a:rPr>
                         <a:t>amount</a:t>
                       </a:r>
-                      <a:endParaRPr lang="en-US" sz="1800" b="0">
+                      <a:endParaRPr lang="en-US" sz="1800" b="0" dirty="0">
                         <a:solidFill>
                           <a:schemeClr val="tx1"/>
                         </a:solidFill>
                         <a:effectLst/>
-                        <a:latin typeface="Calibri" panose="020F0502020204030204" pitchFamily="34" charset="0"/>
-                        <a:ea typeface="Calibri" panose="020F0502020204030204" pitchFamily="34" charset="0"/>
-                        <a:cs typeface="Times New Roman" panose="02020603050405020304" pitchFamily="18" charset="0"/>
-                      </a:endParaRPr>
-                    </a:p>
-                  </a:txBody>
-                  <a:tcPr marL="68580" marR="68580" marT="0" marB="0">
-                    <a:solidFill>
-                      <a:srgbClr val="EFE8E7"/>
-                    </a:solidFill>
-                  </a:tcPr>
-                </a:tc>
-                <a:tc>
-                  <a:txBody>
-                    <a:bodyPr/>
-                    <a:lstStyle/>
-                    <a:p>
-                      <a:pPr marL="0" marR="0">
-                        <a:lnSpc>
-                          <a:spcPct val="107000"/>
-                        </a:lnSpc>
-                        <a:spcBef>
-                          <a:spcPts val="0"/>
-                        </a:spcBef>
-                        <a:spcAft>
-                          <a:spcPts val="0"/>
-                        </a:spcAft>
-                      </a:pPr>
-                      <a:r>
-                        <a:rPr lang="en-GB" sz="1800" b="0">
+                        <a:latin typeface="Times New Roman"/>
+                        <a:ea typeface="Calibri" panose="020F0502020204030204" pitchFamily="34" charset="0"/>
+                        <a:cs typeface="Times New Roman"/>
+                      </a:endParaRPr>
+                    </a:p>
+                  </a:txBody>
+                  <a:tcPr marL="68580" marR="68580" marT="0" marB="0">
+                    <a:solidFill>
+                      <a:srgbClr val="EFE8E7"/>
+                    </a:solidFill>
+                  </a:tcPr>
+                </a:tc>
+                <a:tc>
+                  <a:txBody>
+                    <a:bodyPr/>
+                    <a:lstStyle/>
+                    <a:p>
+                      <a:pPr marL="0" marR="0">
+                        <a:lnSpc>
+                          <a:spcPct val="107000"/>
+                        </a:lnSpc>
+                        <a:spcBef>
+                          <a:spcPts val="0"/>
+                        </a:spcBef>
+                        <a:spcAft>
+                          <a:spcPts val="0"/>
+                        </a:spcAft>
+                      </a:pPr>
+                      <a:r>
+                        <a:rPr lang="en-GB" sz="1800" b="0" dirty="0">
                           <a:solidFill>
                             <a:schemeClr val="tx1"/>
                           </a:solidFill>
                           <a:effectLst/>
-                          <a:latin typeface="Times New Roman" panose="02020603050405020304" pitchFamily="18" charset="0"/>
-                          <a:ea typeface="Times New Roman" panose="02020603050405020304" pitchFamily="18" charset="0"/>
-                          <a:cs typeface="Times New Roman" panose="02020603050405020304" pitchFamily="18" charset="0"/>
+                          <a:latin typeface="Times New Roman"/>
+                          <a:ea typeface="Times New Roman" panose="02020603050405020304" pitchFamily="18" charset="0"/>
+                          <a:cs typeface="Times New Roman"/>
                         </a:rPr>
                         <a:t>number (6,2)</a:t>
                       </a:r>
-                      <a:endParaRPr lang="en-US" sz="1800" b="0">
+                      <a:endParaRPr lang="en-US" sz="1800" b="0" dirty="0">
                         <a:solidFill>
                           <a:schemeClr val="tx1"/>
                         </a:solidFill>
                         <a:effectLst/>
-                        <a:latin typeface="Calibri" panose="020F0502020204030204" pitchFamily="34" charset="0"/>
-                        <a:ea typeface="Calibri" panose="020F0502020204030204" pitchFamily="34" charset="0"/>
-                        <a:cs typeface="Times New Roman" panose="02020603050405020304" pitchFamily="18" charset="0"/>
+                        <a:latin typeface="Times New Roman"/>
+                        <a:ea typeface="Calibri" panose="020F0502020204030204" pitchFamily="34" charset="0"/>
+                        <a:cs typeface="Times New Roman"/>
                       </a:endParaRPr>
                     </a:p>
                   </a:txBody>
@@ -11787,25 +11787,25 @@
                         </a:spcAft>
                       </a:pPr>
                       <a:r>
-                        <a:rPr lang="en-GB" sz="1800" b="0">
+                        <a:rPr lang="en-GB" sz="1800" b="0" dirty="0">
                           <a:solidFill>
                             <a:schemeClr val="tx1"/>
                           </a:solidFill>
                           <a:effectLst/>
-                          <a:latin typeface="Times New Roman" panose="02020603050405020304" pitchFamily="18" charset="0"/>
-                          <a:ea typeface="Times New Roman" panose="02020603050405020304" pitchFamily="18" charset="0"/>
-                          <a:cs typeface="Times New Roman" panose="02020603050405020304" pitchFamily="18" charset="0"/>
+                          <a:latin typeface="Times New Roman"/>
+                          <a:ea typeface="Times New Roman" panose="02020603050405020304" pitchFamily="18" charset="0"/>
+                          <a:cs typeface="Times New Roman"/>
                         </a:rPr>
                         <a:t>-</a:t>
                       </a:r>
-                      <a:endParaRPr lang="en-US" sz="1800" b="0">
+                      <a:endParaRPr lang="en-US" sz="1800" b="0" dirty="0">
                         <a:solidFill>
                           <a:schemeClr val="tx1"/>
                         </a:solidFill>
                         <a:effectLst/>
-                        <a:latin typeface="Calibri" panose="020F0502020204030204" pitchFamily="34" charset="0"/>
-                        <a:ea typeface="Calibri" panose="020F0502020204030204" pitchFamily="34" charset="0"/>
-                        <a:cs typeface="Times New Roman" panose="02020603050405020304" pitchFamily="18" charset="0"/>
+                        <a:latin typeface="Times New Roman"/>
+                        <a:ea typeface="Calibri" panose="020F0502020204030204" pitchFamily="34" charset="0"/>
+                        <a:cs typeface="Times New Roman"/>
                       </a:endParaRPr>
                     </a:p>
                   </a:txBody>
@@ -11828,25 +11828,25 @@
                         </a:spcAft>
                       </a:pPr>
                       <a:r>
-                        <a:rPr lang="en-GB" sz="1800" b="0">
+                        <a:rPr lang="en-GB" sz="1800" b="0" dirty="0">
                           <a:solidFill>
                             <a:schemeClr val="tx1"/>
                           </a:solidFill>
                           <a:effectLst/>
-                          <a:latin typeface="Times New Roman" panose="02020603050405020304" pitchFamily="18" charset="0"/>
-                          <a:ea typeface="Times New Roman" panose="02020603050405020304" pitchFamily="18" charset="0"/>
-                          <a:cs typeface="Times New Roman" panose="02020603050405020304" pitchFamily="18" charset="0"/>
+                          <a:latin typeface="Times New Roman"/>
+                          <a:ea typeface="Times New Roman" panose="02020603050405020304" pitchFamily="18" charset="0"/>
+                          <a:cs typeface="Times New Roman"/>
                         </a:rPr>
                         <a:t>RM 999,999.99</a:t>
                       </a:r>
-                      <a:endParaRPr lang="en-US" sz="1800" b="0">
+                      <a:endParaRPr lang="en-US" sz="1800" b="0" dirty="0">
                         <a:solidFill>
                           <a:schemeClr val="tx1"/>
                         </a:solidFill>
                         <a:effectLst/>
-                        <a:latin typeface="Calibri" panose="020F0502020204030204" pitchFamily="34" charset="0"/>
-                        <a:ea typeface="Calibri" panose="020F0502020204030204" pitchFamily="34" charset="0"/>
-                        <a:cs typeface="Times New Roman" panose="02020603050405020304" pitchFamily="18" charset="0"/>
+                        <a:latin typeface="Times New Roman"/>
+                        <a:ea typeface="Calibri" panose="020F0502020204030204" pitchFamily="34" charset="0"/>
+                        <a:cs typeface="Times New Roman"/>
                       </a:endParaRPr>
                     </a:p>
                   </a:txBody>
@@ -11876,70 +11876,70 @@
                         </a:spcAft>
                       </a:pPr>
                       <a:r>
-                        <a:rPr lang="en-GB" sz="1800" b="0">
+                        <a:rPr lang="en-GB" sz="1800" b="0" dirty="0" err="1">
                           <a:solidFill>
                             <a:schemeClr val="tx1"/>
                           </a:solidFill>
                           <a:effectLst/>
-                          <a:latin typeface="Times New Roman" panose="02020603050405020304" pitchFamily="18" charset="0"/>
-                          <a:ea typeface="Times New Roman" panose="02020603050405020304" pitchFamily="18" charset="0"/>
-                          <a:cs typeface="Times New Roman" panose="02020603050405020304" pitchFamily="18" charset="0"/>
+                          <a:latin typeface="Times New Roman"/>
+                          <a:ea typeface="Times New Roman" panose="02020603050405020304" pitchFamily="18" charset="0"/>
+                          <a:cs typeface="Times New Roman"/>
                         </a:rPr>
                         <a:t>payment_method</a:t>
                       </a:r>
-                      <a:endParaRPr lang="en-US" sz="1800" b="0">
+                      <a:endParaRPr lang="en-US" sz="1800" b="0" dirty="0" err="1">
                         <a:solidFill>
                           <a:schemeClr val="tx1"/>
                         </a:solidFill>
                         <a:effectLst/>
-                        <a:latin typeface="Calibri" panose="020F0502020204030204" pitchFamily="34" charset="0"/>
-                        <a:ea typeface="Calibri" panose="020F0502020204030204" pitchFamily="34" charset="0"/>
-                        <a:cs typeface="Times New Roman" panose="02020603050405020304" pitchFamily="18" charset="0"/>
-                      </a:endParaRPr>
-                    </a:p>
-                  </a:txBody>
-                  <a:tcPr marL="68580" marR="68580" marT="0" marB="0">
-                    <a:solidFill>
-                      <a:srgbClr val="EFE8E7"/>
-                    </a:solidFill>
-                  </a:tcPr>
-                </a:tc>
-                <a:tc>
-                  <a:txBody>
-                    <a:bodyPr/>
-                    <a:lstStyle/>
-                    <a:p>
-                      <a:pPr marL="0" marR="0">
-                        <a:lnSpc>
-                          <a:spcPct val="107000"/>
-                        </a:lnSpc>
-                        <a:spcBef>
-                          <a:spcPts val="0"/>
-                        </a:spcBef>
-                        <a:spcAft>
-                          <a:spcPts val="0"/>
-                        </a:spcAft>
-                      </a:pPr>
-                      <a:r>
-                        <a:rPr lang="en-GB" sz="1800" b="0">
+                        <a:latin typeface="Times New Roman"/>
+                        <a:ea typeface="Calibri" panose="020F0502020204030204" pitchFamily="34" charset="0"/>
+                        <a:cs typeface="Times New Roman"/>
+                      </a:endParaRPr>
+                    </a:p>
+                  </a:txBody>
+                  <a:tcPr marL="68580" marR="68580" marT="0" marB="0">
+                    <a:solidFill>
+                      <a:srgbClr val="EFE8E7"/>
+                    </a:solidFill>
+                  </a:tcPr>
+                </a:tc>
+                <a:tc>
+                  <a:txBody>
+                    <a:bodyPr/>
+                    <a:lstStyle/>
+                    <a:p>
+                      <a:pPr marL="0" marR="0">
+                        <a:lnSpc>
+                          <a:spcPct val="107000"/>
+                        </a:lnSpc>
+                        <a:spcBef>
+                          <a:spcPts val="0"/>
+                        </a:spcBef>
+                        <a:spcAft>
+                          <a:spcPts val="0"/>
+                        </a:spcAft>
+                      </a:pPr>
+                      <a:r>
+                        <a:rPr lang="en-GB" sz="1800" b="0" dirty="0">
                           <a:solidFill>
                             <a:schemeClr val="tx1"/>
                           </a:solidFill>
                           <a:effectLst/>
-                          <a:latin typeface="Times New Roman" panose="02020603050405020304" pitchFamily="18" charset="0"/>
-                          <a:ea typeface="Times New Roman" panose="02020603050405020304" pitchFamily="18" charset="0"/>
-                          <a:cs typeface="Times New Roman" panose="02020603050405020304" pitchFamily="18" charset="0"/>
+                          <a:latin typeface="Times New Roman"/>
+                          <a:ea typeface="Times New Roman" panose="02020603050405020304" pitchFamily="18" charset="0"/>
+                          <a:cs typeface="Times New Roman"/>
                         </a:rPr>
                         <a:t>char(2)</a:t>
                       </a:r>
-                      <a:endParaRPr lang="en-US" sz="1800" b="0">
+                      <a:endParaRPr lang="en-US" sz="1800" b="0" dirty="0">
                         <a:solidFill>
                           <a:schemeClr val="tx1"/>
                         </a:solidFill>
                         <a:effectLst/>
-                        <a:latin typeface="Calibri" panose="020F0502020204030204" pitchFamily="34" charset="0"/>
-                        <a:ea typeface="Calibri" panose="020F0502020204030204" pitchFamily="34" charset="0"/>
-                        <a:cs typeface="Times New Roman" panose="02020603050405020304" pitchFamily="18" charset="0"/>
+                        <a:latin typeface="Times New Roman"/>
+                        <a:ea typeface="Calibri" panose="020F0502020204030204" pitchFamily="34" charset="0"/>
+                        <a:cs typeface="Times New Roman"/>
                       </a:endParaRPr>
                     </a:p>
                   </a:txBody>
@@ -11966,25 +11966,25 @@
                         </a:spcAft>
                       </a:pPr>
                       <a:r>
-                        <a:rPr lang="en-GB" sz="1800" b="0">
+                        <a:rPr lang="en-GB" sz="1800" b="0" dirty="0">
                           <a:solidFill>
                             <a:schemeClr val="tx1"/>
                           </a:solidFill>
                           <a:effectLst/>
-                          <a:latin typeface="Times New Roman" panose="02020603050405020304" pitchFamily="18" charset="0"/>
-                          <a:ea typeface="Times New Roman" panose="02020603050405020304" pitchFamily="18" charset="0"/>
-                          <a:cs typeface="Times New Roman" panose="02020603050405020304" pitchFamily="18" charset="0"/>
+                          <a:latin typeface="Times New Roman"/>
+                          <a:ea typeface="Times New Roman" panose="02020603050405020304" pitchFamily="18" charset="0"/>
+                          <a:cs typeface="Times New Roman"/>
                         </a:rPr>
                         <a:t>-</a:t>
                       </a:r>
-                      <a:endParaRPr lang="en-US" sz="1800" b="0">
+                      <a:endParaRPr lang="en-US" sz="1800" b="0" dirty="0">
                         <a:solidFill>
                           <a:schemeClr val="tx1"/>
                         </a:solidFill>
                         <a:effectLst/>
-                        <a:latin typeface="Calibri" panose="020F0502020204030204" pitchFamily="34" charset="0"/>
-                        <a:ea typeface="Calibri" panose="020F0502020204030204" pitchFamily="34" charset="0"/>
-                        <a:cs typeface="Times New Roman" panose="02020603050405020304" pitchFamily="18" charset="0"/>
+                        <a:latin typeface="Times New Roman"/>
+                        <a:ea typeface="Calibri" panose="020F0502020204030204" pitchFamily="34" charset="0"/>
+                        <a:cs typeface="Times New Roman"/>
                       </a:endParaRPr>
                     </a:p>
                   </a:txBody>
@@ -12007,25 +12007,25 @@
                         </a:spcAft>
                       </a:pPr>
                       <a:r>
-                        <a:rPr lang="en-GB" sz="1800" b="0">
+                        <a:rPr lang="en-GB" sz="1800" b="0" dirty="0">
                           <a:solidFill>
                             <a:schemeClr val="tx1"/>
                           </a:solidFill>
                           <a:effectLst/>
-                          <a:latin typeface="Times New Roman" panose="02020603050405020304" pitchFamily="18" charset="0"/>
-                          <a:ea typeface="Times New Roman" panose="02020603050405020304" pitchFamily="18" charset="0"/>
-                          <a:cs typeface="Times New Roman" panose="02020603050405020304" pitchFamily="18" charset="0"/>
+                          <a:latin typeface="Times New Roman"/>
+                          <a:ea typeface="Times New Roman" panose="02020603050405020304" pitchFamily="18" charset="0"/>
+                          <a:cs typeface="Times New Roman"/>
                         </a:rPr>
                         <a:t>-</a:t>
                       </a:r>
-                      <a:endParaRPr lang="en-US" sz="1800" b="0">
+                      <a:endParaRPr lang="en-US" sz="1800" b="0" dirty="0">
                         <a:solidFill>
                           <a:schemeClr val="tx1"/>
                         </a:solidFill>
                         <a:effectLst/>
-                        <a:latin typeface="Calibri" panose="020F0502020204030204" pitchFamily="34" charset="0"/>
-                        <a:ea typeface="Calibri" panose="020F0502020204030204" pitchFamily="34" charset="0"/>
-                        <a:cs typeface="Times New Roman" panose="02020603050405020304" pitchFamily="18" charset="0"/>
+                        <a:latin typeface="Times New Roman"/>
+                        <a:ea typeface="Calibri" panose="020F0502020204030204" pitchFamily="34" charset="0"/>
+                        <a:cs typeface="Times New Roman"/>
                       </a:endParaRPr>
                     </a:p>
                   </a:txBody>
@@ -12055,70 +12055,70 @@
                         </a:spcAft>
                       </a:pPr>
                       <a:r>
-                        <a:rPr lang="en-GB" sz="1800" b="0">
+                        <a:rPr lang="en-GB" sz="1800" b="0" dirty="0" err="1">
                           <a:solidFill>
                             <a:schemeClr val="tx1"/>
                           </a:solidFill>
                           <a:effectLst/>
-                          <a:latin typeface="Times New Roman" panose="02020603050405020304" pitchFamily="18" charset="0"/>
-                          <a:ea typeface="Times New Roman" panose="02020603050405020304" pitchFamily="18" charset="0"/>
-                          <a:cs typeface="Times New Roman" panose="02020603050405020304" pitchFamily="18" charset="0"/>
+                          <a:latin typeface="Times New Roman"/>
+                          <a:ea typeface="Times New Roman" panose="02020603050405020304" pitchFamily="18" charset="0"/>
+                          <a:cs typeface="Times New Roman"/>
                         </a:rPr>
                         <a:t>payment_date</a:t>
                       </a:r>
-                      <a:endParaRPr lang="en-US" sz="1800" b="0">
+                      <a:endParaRPr lang="en-US" sz="1800" b="0" dirty="0" err="1">
                         <a:solidFill>
                           <a:schemeClr val="tx1"/>
                         </a:solidFill>
                         <a:effectLst/>
-                        <a:latin typeface="Calibri" panose="020F0502020204030204" pitchFamily="34" charset="0"/>
-                        <a:ea typeface="Calibri" panose="020F0502020204030204" pitchFamily="34" charset="0"/>
-                        <a:cs typeface="Times New Roman" panose="02020603050405020304" pitchFamily="18" charset="0"/>
-                      </a:endParaRPr>
-                    </a:p>
-                  </a:txBody>
-                  <a:tcPr marL="68580" marR="68580" marT="0" marB="0">
-                    <a:solidFill>
-                      <a:srgbClr val="EFE8E7"/>
-                    </a:solidFill>
-                  </a:tcPr>
-                </a:tc>
-                <a:tc>
-                  <a:txBody>
-                    <a:bodyPr/>
-                    <a:lstStyle/>
-                    <a:p>
-                      <a:pPr marL="0" marR="0">
-                        <a:lnSpc>
-                          <a:spcPct val="107000"/>
-                        </a:lnSpc>
-                        <a:spcBef>
-                          <a:spcPts val="0"/>
-                        </a:spcBef>
-                        <a:spcAft>
-                          <a:spcPts val="0"/>
-                        </a:spcAft>
-                      </a:pPr>
-                      <a:r>
-                        <a:rPr lang="en-GB" sz="1800" b="0">
+                        <a:latin typeface="Times New Roman"/>
+                        <a:ea typeface="Calibri" panose="020F0502020204030204" pitchFamily="34" charset="0"/>
+                        <a:cs typeface="Times New Roman"/>
+                      </a:endParaRPr>
+                    </a:p>
+                  </a:txBody>
+                  <a:tcPr marL="68580" marR="68580" marT="0" marB="0">
+                    <a:solidFill>
+                      <a:srgbClr val="EFE8E7"/>
+                    </a:solidFill>
+                  </a:tcPr>
+                </a:tc>
+                <a:tc>
+                  <a:txBody>
+                    <a:bodyPr/>
+                    <a:lstStyle/>
+                    <a:p>
+                      <a:pPr marL="0" marR="0">
+                        <a:lnSpc>
+                          <a:spcPct val="107000"/>
+                        </a:lnSpc>
+                        <a:spcBef>
+                          <a:spcPts val="0"/>
+                        </a:spcBef>
+                        <a:spcAft>
+                          <a:spcPts val="0"/>
+                        </a:spcAft>
+                      </a:pPr>
+                      <a:r>
+                        <a:rPr lang="en-GB" sz="1800" b="0" dirty="0">
                           <a:solidFill>
                             <a:schemeClr val="tx1"/>
                           </a:solidFill>
                           <a:effectLst/>
-                          <a:latin typeface="Times New Roman" panose="02020603050405020304" pitchFamily="18" charset="0"/>
-                          <a:ea typeface="Times New Roman" panose="02020603050405020304" pitchFamily="18" charset="0"/>
-                          <a:cs typeface="Times New Roman" panose="02020603050405020304" pitchFamily="18" charset="0"/>
+                          <a:latin typeface="Times New Roman"/>
+                          <a:ea typeface="Times New Roman" panose="02020603050405020304" pitchFamily="18" charset="0"/>
+                          <a:cs typeface="Times New Roman"/>
                         </a:rPr>
                         <a:t>date</a:t>
                       </a:r>
-                      <a:endParaRPr lang="en-US" sz="1800" b="0">
+                      <a:endParaRPr lang="en-US" sz="1800" b="0" dirty="0">
                         <a:solidFill>
                           <a:schemeClr val="tx1"/>
                         </a:solidFill>
                         <a:effectLst/>
-                        <a:latin typeface="Calibri" panose="020F0502020204030204" pitchFamily="34" charset="0"/>
-                        <a:ea typeface="Calibri" panose="020F0502020204030204" pitchFamily="34" charset="0"/>
-                        <a:cs typeface="Times New Roman" panose="02020603050405020304" pitchFamily="18" charset="0"/>
+                        <a:latin typeface="Times New Roman"/>
+                        <a:ea typeface="Calibri" panose="020F0502020204030204" pitchFamily="34" charset="0"/>
+                        <a:cs typeface="Times New Roman"/>
                       </a:endParaRPr>
                     </a:p>
                   </a:txBody>
@@ -12145,25 +12145,25 @@
                         </a:spcAft>
                       </a:pPr>
                       <a:r>
-                        <a:rPr lang="en-GB" sz="1800" b="0">
+                        <a:rPr lang="en-GB" sz="1800" b="0" dirty="0">
                           <a:solidFill>
                             <a:schemeClr val="tx1"/>
                           </a:solidFill>
                           <a:effectLst/>
-                          <a:latin typeface="Times New Roman" panose="02020603050405020304" pitchFamily="18" charset="0"/>
-                          <a:ea typeface="Times New Roman" panose="02020603050405020304" pitchFamily="18" charset="0"/>
-                          <a:cs typeface="Times New Roman" panose="02020603050405020304" pitchFamily="18" charset="0"/>
+                          <a:latin typeface="Times New Roman"/>
+                          <a:ea typeface="Times New Roman" panose="02020603050405020304" pitchFamily="18" charset="0"/>
+                          <a:cs typeface="Times New Roman"/>
                         </a:rPr>
                         <a:t>-</a:t>
                       </a:r>
-                      <a:endParaRPr lang="en-US" sz="1800" b="0">
+                      <a:endParaRPr lang="en-US" sz="1800" b="0" dirty="0">
                         <a:solidFill>
                           <a:schemeClr val="tx1"/>
                         </a:solidFill>
                         <a:effectLst/>
-                        <a:latin typeface="Calibri" panose="020F0502020204030204" pitchFamily="34" charset="0"/>
-                        <a:ea typeface="Calibri" panose="020F0502020204030204" pitchFamily="34" charset="0"/>
-                        <a:cs typeface="Times New Roman" panose="02020603050405020304" pitchFamily="18" charset="0"/>
+                        <a:latin typeface="Times New Roman"/>
+                        <a:ea typeface="Calibri" panose="020F0502020204030204" pitchFamily="34" charset="0"/>
+                        <a:cs typeface="Times New Roman"/>
                       </a:endParaRPr>
                     </a:p>
                   </a:txBody>
@@ -12186,25 +12186,25 @@
                         </a:spcAft>
                       </a:pPr>
                       <a:r>
-                        <a:rPr lang="en-GB" sz="1800" b="0">
+                        <a:rPr lang="en-GB" sz="1800" b="0" dirty="0">
                           <a:solidFill>
                             <a:schemeClr val="tx1"/>
                           </a:solidFill>
                           <a:effectLst/>
-                          <a:latin typeface="Times New Roman" panose="02020603050405020304" pitchFamily="18" charset="0"/>
-                          <a:ea typeface="Times New Roman" panose="02020603050405020304" pitchFamily="18" charset="0"/>
-                          <a:cs typeface="Times New Roman" panose="02020603050405020304" pitchFamily="18" charset="0"/>
+                          <a:latin typeface="Times New Roman"/>
+                          <a:ea typeface="Times New Roman" panose="02020603050405020304" pitchFamily="18" charset="0"/>
+                          <a:cs typeface="Times New Roman"/>
                         </a:rPr>
                         <a:t>DD/MM/YYYY</a:t>
                       </a:r>
-                      <a:endParaRPr lang="en-US" sz="1800" b="0">
+                      <a:endParaRPr lang="en-US" sz="1800" b="0" dirty="0">
                         <a:solidFill>
                           <a:schemeClr val="tx1"/>
                         </a:solidFill>
                         <a:effectLst/>
-                        <a:latin typeface="Calibri" panose="020F0502020204030204" pitchFamily="34" charset="0"/>
-                        <a:ea typeface="Calibri" panose="020F0502020204030204" pitchFamily="34" charset="0"/>
-                        <a:cs typeface="Times New Roman" panose="02020603050405020304" pitchFamily="18" charset="0"/>
+                        <a:latin typeface="Times New Roman"/>
+                        <a:ea typeface="Calibri" panose="020F0502020204030204" pitchFamily="34" charset="0"/>
+                        <a:cs typeface="Times New Roman"/>
                       </a:endParaRPr>
                     </a:p>
                   </a:txBody>
@@ -12234,115 +12234,115 @@
                         </a:spcAft>
                       </a:pPr>
                       <a:r>
-                        <a:rPr lang="en-GB" sz="1800" b="0">
+                        <a:rPr lang="en-GB" sz="1800" b="0" dirty="0" err="1">
                           <a:solidFill>
                             <a:schemeClr val="tx1"/>
                           </a:solidFill>
                           <a:effectLst/>
-                          <a:latin typeface="Times New Roman" panose="02020603050405020304" pitchFamily="18" charset="0"/>
-                          <a:ea typeface="Times New Roman" panose="02020603050405020304" pitchFamily="18" charset="0"/>
-                          <a:cs typeface="Times New Roman" panose="02020603050405020304" pitchFamily="18" charset="0"/>
+                          <a:latin typeface="Times New Roman"/>
+                          <a:ea typeface="Times New Roman" panose="02020603050405020304" pitchFamily="18" charset="0"/>
+                          <a:cs typeface="Times New Roman"/>
                         </a:rPr>
                         <a:t>report_no</a:t>
                       </a:r>
-                      <a:endParaRPr lang="en-US" sz="1800" b="0">
+                      <a:endParaRPr lang="en-US" sz="1800" b="0" dirty="0" err="1">
                         <a:solidFill>
                           <a:schemeClr val="tx1"/>
                         </a:solidFill>
                         <a:effectLst/>
-                        <a:latin typeface="Calibri" panose="020F0502020204030204" pitchFamily="34" charset="0"/>
-                        <a:ea typeface="Calibri" panose="020F0502020204030204" pitchFamily="34" charset="0"/>
-                        <a:cs typeface="Times New Roman" panose="02020603050405020304" pitchFamily="18" charset="0"/>
-                      </a:endParaRPr>
-                    </a:p>
-                  </a:txBody>
-                  <a:tcPr marL="68580" marR="68580" marT="0" marB="0">
-                    <a:solidFill>
-                      <a:srgbClr val="EFE8E7"/>
-                    </a:solidFill>
-                  </a:tcPr>
-                </a:tc>
-                <a:tc>
-                  <a:txBody>
-                    <a:bodyPr/>
-                    <a:lstStyle/>
-                    <a:p>
-                      <a:pPr marL="0" marR="0">
-                        <a:lnSpc>
-                          <a:spcPct val="107000"/>
-                        </a:lnSpc>
-                        <a:spcBef>
-                          <a:spcPts val="0"/>
-                        </a:spcBef>
-                        <a:spcAft>
-                          <a:spcPts val="0"/>
-                        </a:spcAft>
-                      </a:pPr>
-                      <a:r>
-                        <a:rPr lang="en-GB" sz="1800" b="0">
+                        <a:latin typeface="Times New Roman"/>
+                        <a:ea typeface="Calibri" panose="020F0502020204030204" pitchFamily="34" charset="0"/>
+                        <a:cs typeface="Times New Roman"/>
+                      </a:endParaRPr>
+                    </a:p>
+                  </a:txBody>
+                  <a:tcPr marL="68580" marR="68580" marT="0" marB="0">
+                    <a:solidFill>
+                      <a:srgbClr val="EFE8E7"/>
+                    </a:solidFill>
+                  </a:tcPr>
+                </a:tc>
+                <a:tc>
+                  <a:txBody>
+                    <a:bodyPr/>
+                    <a:lstStyle/>
+                    <a:p>
+                      <a:pPr marL="0" marR="0">
+                        <a:lnSpc>
+                          <a:spcPct val="107000"/>
+                        </a:lnSpc>
+                        <a:spcBef>
+                          <a:spcPts val="0"/>
+                        </a:spcBef>
+                        <a:spcAft>
+                          <a:spcPts val="0"/>
+                        </a:spcAft>
+                      </a:pPr>
+                      <a:r>
+                        <a:rPr lang="en-GB" sz="1800" b="0" dirty="0">
                           <a:solidFill>
                             <a:schemeClr val="tx1"/>
                           </a:solidFill>
                           <a:effectLst/>
-                          <a:latin typeface="Times New Roman" panose="02020603050405020304" pitchFamily="18" charset="0"/>
-                          <a:ea typeface="Times New Roman" panose="02020603050405020304" pitchFamily="18" charset="0"/>
-                          <a:cs typeface="Times New Roman" panose="02020603050405020304" pitchFamily="18" charset="0"/>
+                          <a:latin typeface="Times New Roman"/>
+                          <a:ea typeface="Times New Roman" panose="02020603050405020304" pitchFamily="18" charset="0"/>
+                          <a:cs typeface="Times New Roman"/>
                         </a:rPr>
                         <a:t>varchar(6)</a:t>
                       </a:r>
-                      <a:endParaRPr lang="en-US" sz="1800" b="0">
+                      <a:endParaRPr lang="en-US" sz="1800" b="0" dirty="0">
                         <a:solidFill>
                           <a:schemeClr val="tx1"/>
                         </a:solidFill>
                         <a:effectLst/>
-                        <a:latin typeface="Calibri" panose="020F0502020204030204" pitchFamily="34" charset="0"/>
-                        <a:ea typeface="Calibri" panose="020F0502020204030204" pitchFamily="34" charset="0"/>
-                        <a:cs typeface="Times New Roman" panose="02020603050405020304" pitchFamily="18" charset="0"/>
-                      </a:endParaRPr>
-                    </a:p>
-                  </a:txBody>
-                  <a:tcPr marL="68580" marR="68580" marT="0" marB="0">
-                    <a:solidFill>
-                      <a:srgbClr val="EFE8E7"/>
-                    </a:solidFill>
-                  </a:tcPr>
-                </a:tc>
-                <a:tc>
-                  <a:txBody>
-                    <a:bodyPr/>
-                    <a:lstStyle/>
-                    <a:p>
-                      <a:pPr marL="0" marR="0">
-                        <a:lnSpc>
-                          <a:spcPct val="107000"/>
-                        </a:lnSpc>
-                        <a:spcBef>
-                          <a:spcPts val="0"/>
-                        </a:spcBef>
-                        <a:spcAft>
-                          <a:spcPts val="0"/>
-                        </a:spcAft>
-                      </a:pPr>
-                      <a:r>
-                        <a:rPr lang="en-GB" sz="1800" b="0">
+                        <a:latin typeface="Times New Roman"/>
+                        <a:ea typeface="Calibri" panose="020F0502020204030204" pitchFamily="34" charset="0"/>
+                        <a:cs typeface="Times New Roman"/>
+                      </a:endParaRPr>
+                    </a:p>
+                  </a:txBody>
+                  <a:tcPr marL="68580" marR="68580" marT="0" marB="0">
+                    <a:solidFill>
+                      <a:srgbClr val="EFE8E7"/>
+                    </a:solidFill>
+                  </a:tcPr>
+                </a:tc>
+                <a:tc>
+                  <a:txBody>
+                    <a:bodyPr/>
+                    <a:lstStyle/>
+                    <a:p>
+                      <a:pPr marL="0" marR="0">
+                        <a:lnSpc>
+                          <a:spcPct val="107000"/>
+                        </a:lnSpc>
+                        <a:spcBef>
+                          <a:spcPts val="0"/>
+                        </a:spcBef>
+                        <a:spcAft>
+                          <a:spcPts val="0"/>
+                        </a:spcAft>
+                      </a:pPr>
+                      <a:r>
+                        <a:rPr lang="en-GB" sz="1800" b="0" dirty="0">
                           <a:solidFill>
                             <a:schemeClr val="tx1"/>
                           </a:solidFill>
                           <a:effectLst/>
-                          <a:latin typeface="Times New Roman" panose="02020603050405020304" pitchFamily="18" charset="0"/>
-                          <a:ea typeface="Times New Roman" panose="02020603050405020304" pitchFamily="18" charset="0"/>
-                          <a:cs typeface="Times New Roman" panose="02020603050405020304" pitchFamily="18" charset="0"/>
+                          <a:latin typeface="Times New Roman"/>
+                          <a:ea typeface="Times New Roman" panose="02020603050405020304" pitchFamily="18" charset="0"/>
+                          <a:cs typeface="Times New Roman"/>
                         </a:rPr>
                         <a:t>Foreign Key</a:t>
                       </a:r>
-                      <a:endParaRPr lang="en-US" sz="1800" b="0">
+                      <a:endParaRPr lang="en-US" sz="1800" b="0" dirty="0">
                         <a:solidFill>
                           <a:schemeClr val="tx1"/>
                         </a:solidFill>
                         <a:effectLst/>
-                        <a:latin typeface="Calibri" panose="020F0502020204030204" pitchFamily="34" charset="0"/>
-                        <a:ea typeface="Calibri" panose="020F0502020204030204" pitchFamily="34" charset="0"/>
-                        <a:cs typeface="Times New Roman" panose="02020603050405020304" pitchFamily="18" charset="0"/>
+                        <a:latin typeface="Times New Roman"/>
+                        <a:ea typeface="Calibri" panose="020F0502020204030204" pitchFamily="34" charset="0"/>
+                        <a:cs typeface="Times New Roman"/>
                       </a:endParaRPr>
                     </a:p>
                   </a:txBody>
@@ -12353,38 +12353,29 @@
                     <a:bodyPr/>
                     <a:lstStyle/>
                     <a:p>
-                      <a:pPr marL="0" marR="0" algn="ctr">
-                        <a:lnSpc>
-                          <a:spcPct val="107000"/>
-                        </a:lnSpc>
-                        <a:spcBef>
-                          <a:spcPts val="0"/>
-                        </a:spcBef>
-                        <a:spcAft>
-                          <a:spcPts val="0"/>
-                        </a:spcAft>
-                      </a:pPr>
-                      <a:r>
-                        <a:rPr lang="en-GB" sz="1800" b="0">
+                      <a:pPr marL="0" marR="0" algn="l">
+                        <a:lnSpc>
+                          <a:spcPct val="107000"/>
+                        </a:lnSpc>
+                        <a:spcBef>
+                          <a:spcPts val="0"/>
+                        </a:spcBef>
+                        <a:spcAft>
+                          <a:spcPts val="0"/>
+                        </a:spcAft>
+                      </a:pPr>
+                      <a:r>
+                        <a:rPr lang="en-GB" sz="1800" b="0" dirty="0">
                           <a:solidFill>
                             <a:schemeClr val="tx1"/>
                           </a:solidFill>
                           <a:effectLst/>
-                          <a:latin typeface="Times New Roman" panose="02020603050405020304" pitchFamily="18" charset="0"/>
-                          <a:ea typeface="Times New Roman" panose="02020603050405020304" pitchFamily="18" charset="0"/>
-                          <a:cs typeface="Times New Roman" panose="02020603050405020304" pitchFamily="18" charset="0"/>
-                        </a:rPr>
-                        <a:t>-</a:t>
-                      </a:r>
-                      <a:endParaRPr lang="en-US" sz="1800" b="0">
-                        <a:solidFill>
-                          <a:schemeClr val="tx1"/>
-                        </a:solidFill>
-                        <a:effectLst/>
-                        <a:latin typeface="Calibri" panose="020F0502020204030204" pitchFamily="34" charset="0"/>
-                        <a:ea typeface="Calibri" panose="020F0502020204030204" pitchFamily="34" charset="0"/>
-                        <a:cs typeface="Times New Roman" panose="02020603050405020304" pitchFamily="18" charset="0"/>
-                      </a:endParaRPr>
+                          <a:latin typeface="Times New Roman"/>
+                          <a:ea typeface="Calibri" panose="020F0502020204030204" pitchFamily="34" charset="0"/>
+                          <a:cs typeface="Times New Roman"/>
+                        </a:rPr>
+                        <a:t>Reference Report Table</a:t>
+                      </a:r>
                     </a:p>
                   </a:txBody>
                   <a:tcPr marL="68580" marR="68580" marT="0" marB="0"/>
@@ -12413,126 +12404,40 @@
                         </a:spcAft>
                       </a:pPr>
                       <a:r>
-                        <a:rPr lang="en-GB" sz="1800" b="0">
+                        <a:rPr lang="en-GB" sz="1800" b="0" dirty="0" err="1">
                           <a:solidFill>
                             <a:schemeClr val="tx1"/>
                           </a:solidFill>
                           <a:effectLst/>
-                          <a:latin typeface="Times New Roman" panose="02020603050405020304" pitchFamily="18" charset="0"/>
-                          <a:ea typeface="Times New Roman" panose="02020603050405020304" pitchFamily="18" charset="0"/>
-                          <a:cs typeface="Times New Roman" panose="02020603050405020304" pitchFamily="18" charset="0"/>
+                          <a:latin typeface="Times New Roman"/>
+                          <a:ea typeface="Times New Roman" panose="02020603050405020304" pitchFamily="18" charset="0"/>
+                          <a:cs typeface="Times New Roman"/>
                         </a:rPr>
                         <a:t>account_no</a:t>
                       </a:r>
-                      <a:endParaRPr lang="en-US" sz="1800" b="0">
+                      <a:endParaRPr lang="en-US" sz="1800" b="0" dirty="0" err="1">
                         <a:solidFill>
                           <a:schemeClr val="tx1"/>
                         </a:solidFill>
                         <a:effectLst/>
-                        <a:latin typeface="Calibri" panose="020F0502020204030204" pitchFamily="34" charset="0"/>
-                        <a:ea typeface="Calibri" panose="020F0502020204030204" pitchFamily="34" charset="0"/>
-                        <a:cs typeface="Times New Roman" panose="02020603050405020304" pitchFamily="18" charset="0"/>
-                      </a:endParaRPr>
-                    </a:p>
-                  </a:txBody>
-                  <a:tcPr marL="68580" marR="68580" marT="0" marB="0">
-                    <a:solidFill>
-                      <a:srgbClr val="EFE8E7"/>
-                    </a:solidFill>
-                  </a:tcPr>
-                </a:tc>
-                <a:tc>
-                  <a:txBody>
-                    <a:bodyPr/>
-                    <a:lstStyle/>
-                    <a:p>
-                      <a:pPr marL="0" marR="0">
-                        <a:lnSpc>
-                          <a:spcPct val="107000"/>
-                        </a:lnSpc>
-                        <a:spcBef>
-                          <a:spcPts val="0"/>
-                        </a:spcBef>
-                        <a:spcAft>
-                          <a:spcPts val="0"/>
-                        </a:spcAft>
-                      </a:pPr>
-                      <a:r>
-                        <a:rPr lang="en-GB" sz="1800" b="0">
-                          <a:solidFill>
-                            <a:schemeClr val="tx1"/>
-                          </a:solidFill>
-                          <a:effectLst/>
-                          <a:latin typeface="Times New Roman" panose="02020603050405020304" pitchFamily="18" charset="0"/>
-                          <a:ea typeface="Times New Roman" panose="02020603050405020304" pitchFamily="18" charset="0"/>
-                          <a:cs typeface="Times New Roman" panose="02020603050405020304" pitchFamily="18" charset="0"/>
-                        </a:rPr>
-                        <a:t>varchar(6)</a:t>
-                      </a:r>
-                      <a:endParaRPr lang="en-US" sz="1800" b="0">
-                        <a:solidFill>
-                          <a:schemeClr val="tx1"/>
-                        </a:solidFill>
-                        <a:effectLst/>
-                        <a:latin typeface="Calibri" panose="020F0502020204030204" pitchFamily="34" charset="0"/>
-                        <a:ea typeface="Calibri" panose="020F0502020204030204" pitchFamily="34" charset="0"/>
-                        <a:cs typeface="Times New Roman" panose="02020603050405020304" pitchFamily="18" charset="0"/>
-                      </a:endParaRPr>
-                    </a:p>
-                  </a:txBody>
-                  <a:tcPr marL="68580" marR="68580" marT="0" marB="0">
-                    <a:solidFill>
-                      <a:srgbClr val="EFE8E7"/>
-                    </a:solidFill>
-                  </a:tcPr>
-                </a:tc>
-                <a:tc>
-                  <a:txBody>
-                    <a:bodyPr/>
-                    <a:lstStyle/>
-                    <a:p>
-                      <a:pPr marL="0" marR="0">
-                        <a:lnSpc>
-                          <a:spcPct val="107000"/>
-                        </a:lnSpc>
-                        <a:spcBef>
-                          <a:spcPts val="0"/>
-                        </a:spcBef>
-                        <a:spcAft>
-                          <a:spcPts val="0"/>
-                        </a:spcAft>
-                      </a:pPr>
-                      <a:r>
-                        <a:rPr lang="en-GB" sz="1800" b="0">
-                          <a:solidFill>
-                            <a:schemeClr val="tx1"/>
-                          </a:solidFill>
-                          <a:effectLst/>
-                          <a:latin typeface="Times New Roman" panose="02020603050405020304" pitchFamily="18" charset="0"/>
-                          <a:ea typeface="Times New Roman" panose="02020603050405020304" pitchFamily="18" charset="0"/>
-                          <a:cs typeface="Times New Roman" panose="02020603050405020304" pitchFamily="18" charset="0"/>
-                        </a:rPr>
-                        <a:t>Foreign Key</a:t>
-                      </a:r>
-                      <a:endParaRPr lang="en-US" sz="1800" b="0">
-                        <a:solidFill>
-                          <a:schemeClr val="tx1"/>
-                        </a:solidFill>
-                        <a:effectLst/>
-                        <a:latin typeface="Calibri" panose="020F0502020204030204" pitchFamily="34" charset="0"/>
-                        <a:ea typeface="Calibri" panose="020F0502020204030204" pitchFamily="34" charset="0"/>
-                        <a:cs typeface="Times New Roman" panose="02020603050405020304" pitchFamily="18" charset="0"/>
-                      </a:endParaRPr>
-                    </a:p>
-                  </a:txBody>
-                  <a:tcPr marL="68580" marR="68580" marT="0" marB="0"/>
-                </a:tc>
-                <a:tc>
-                  <a:txBody>
-                    <a:bodyPr/>
-                    <a:lstStyle/>
-                    <a:p>
-                      <a:pPr marL="0" marR="0" algn="ctr">
+                        <a:latin typeface="Times New Roman"/>
+                        <a:ea typeface="Calibri" panose="020F0502020204030204" pitchFamily="34" charset="0"/>
+                        <a:cs typeface="Times New Roman"/>
+                      </a:endParaRPr>
+                    </a:p>
+                  </a:txBody>
+                  <a:tcPr marL="68580" marR="68580" marT="0" marB="0">
+                    <a:solidFill>
+                      <a:srgbClr val="EFE8E7"/>
+                    </a:solidFill>
+                  </a:tcPr>
+                </a:tc>
+                <a:tc>
+                  <a:txBody>
+                    <a:bodyPr/>
+                    <a:lstStyle/>
+                    <a:p>
+                      <a:pPr marL="0" marR="0">
                         <a:lnSpc>
                           <a:spcPct val="107000"/>
                         </a:lnSpc>
@@ -12549,21 +12454,98 @@
                             <a:schemeClr val="tx1"/>
                           </a:solidFill>
                           <a:effectLst/>
-                          <a:latin typeface="Times New Roman" panose="02020603050405020304" pitchFamily="18" charset="0"/>
-                          <a:ea typeface="Times New Roman" panose="02020603050405020304" pitchFamily="18" charset="0"/>
-                          <a:cs typeface="Times New Roman" panose="02020603050405020304" pitchFamily="18" charset="0"/>
-                        </a:rPr>
-                        <a:t>-</a:t>
+                          <a:latin typeface="Times New Roman"/>
+                          <a:ea typeface="Times New Roman" panose="02020603050405020304" pitchFamily="18" charset="0"/>
+                          <a:cs typeface="Times New Roman"/>
+                        </a:rPr>
+                        <a:t>varchar(6)</a:t>
                       </a:r>
                       <a:endParaRPr lang="en-US" sz="1800" b="0" dirty="0">
                         <a:solidFill>
                           <a:schemeClr val="tx1"/>
                         </a:solidFill>
                         <a:effectLst/>
-                        <a:latin typeface="Calibri" panose="020F0502020204030204" pitchFamily="34" charset="0"/>
-                        <a:ea typeface="Calibri" panose="020F0502020204030204" pitchFamily="34" charset="0"/>
-                        <a:cs typeface="Times New Roman" panose="02020603050405020304" pitchFamily="18" charset="0"/>
-                      </a:endParaRPr>
+                        <a:latin typeface="Times New Roman"/>
+                        <a:ea typeface="Calibri" panose="020F0502020204030204" pitchFamily="34" charset="0"/>
+                        <a:cs typeface="Times New Roman"/>
+                      </a:endParaRPr>
+                    </a:p>
+                  </a:txBody>
+                  <a:tcPr marL="68580" marR="68580" marT="0" marB="0">
+                    <a:solidFill>
+                      <a:srgbClr val="EFE8E7"/>
+                    </a:solidFill>
+                  </a:tcPr>
+                </a:tc>
+                <a:tc>
+                  <a:txBody>
+                    <a:bodyPr/>
+                    <a:lstStyle/>
+                    <a:p>
+                      <a:pPr marL="0" marR="0">
+                        <a:lnSpc>
+                          <a:spcPct val="107000"/>
+                        </a:lnSpc>
+                        <a:spcBef>
+                          <a:spcPts val="0"/>
+                        </a:spcBef>
+                        <a:spcAft>
+                          <a:spcPts val="0"/>
+                        </a:spcAft>
+                      </a:pPr>
+                      <a:r>
+                        <a:rPr lang="en-GB" sz="1800" b="0" dirty="0">
+                          <a:solidFill>
+                            <a:schemeClr val="tx1"/>
+                          </a:solidFill>
+                          <a:effectLst/>
+                          <a:latin typeface="Times New Roman"/>
+                          <a:ea typeface="Times New Roman" panose="02020603050405020304" pitchFamily="18" charset="0"/>
+                          <a:cs typeface="Times New Roman"/>
+                        </a:rPr>
+                        <a:t>Foreign Key</a:t>
+                      </a:r>
+                      <a:endParaRPr lang="en-US" sz="1800" b="0" dirty="0">
+                        <a:solidFill>
+                          <a:schemeClr val="tx1"/>
+                        </a:solidFill>
+                        <a:effectLst/>
+                        <a:latin typeface="Times New Roman"/>
+                        <a:ea typeface="Calibri" panose="020F0502020204030204" pitchFamily="34" charset="0"/>
+                        <a:cs typeface="Times New Roman"/>
+                      </a:endParaRPr>
+                    </a:p>
+                  </a:txBody>
+                  <a:tcPr marL="68580" marR="68580" marT="0" marB="0"/>
+                </a:tc>
+                <a:tc>
+                  <a:txBody>
+                    <a:bodyPr/>
+                    <a:lstStyle/>
+                    <a:p>
+                      <a:pPr marL="0" marR="0" lvl="0" algn="l">
+                        <a:lnSpc>
+                          <a:spcPct val="107000"/>
+                        </a:lnSpc>
+                        <a:spcBef>
+                          <a:spcPts val="0"/>
+                        </a:spcBef>
+                        <a:spcAft>
+                          <a:spcPts val="0"/>
+                        </a:spcAft>
+                      </a:pPr>
+                      <a:r>
+                        <a:rPr lang="en-GB" sz="1800" b="0" dirty="0">
+                          <a:solidFill>
+                            <a:schemeClr val="tx1"/>
+                          </a:solidFill>
+                          <a:effectLst/>
+                          <a:latin typeface="Times New Roman"/>
+                          <a:ea typeface="Calibri" panose="020F0502020204030204" pitchFamily="34" charset="0"/>
+                          <a:cs typeface="Times New Roman"/>
+                        </a:rPr>
+                        <a:t>Reference Account Table</a:t>
+                      </a:r>
                     </a:p>
                   </a:txBody>
                   <a:tcPr marL="68580" marR="68580" marT="0" marB="0"/>

</xml_diff>